<commit_message>
[feat] support freeforms, suppress font parsing
</commit_message>
<xml_diff>
--- a/test/test.pptx
+++ b/test/test.pptx
@@ -259,7 +259,7 @@
           <a:p>
             <a:fld id="{66B101DA-477C-8F46-972E-1B35D2B6D4D5}" type="datetimeFigureOut">
               <a:rPr kumimoji="1" lang="zh-CN" altLang="en-US" smtClean="0"/>
-              <a:t>2025/3/21</a:t>
+              <a:t>2025/6/13</a:t>
             </a:fld>
             <a:endParaRPr kumimoji="1" lang="zh-CN" altLang="en-US"/>
           </a:p>
@@ -457,7 +457,7 @@
           <a:p>
             <a:fld id="{66B101DA-477C-8F46-972E-1B35D2B6D4D5}" type="datetimeFigureOut">
               <a:rPr kumimoji="1" lang="zh-CN" altLang="en-US" smtClean="0"/>
-              <a:t>2025/3/21</a:t>
+              <a:t>2025/6/13</a:t>
             </a:fld>
             <a:endParaRPr kumimoji="1" lang="zh-CN" altLang="en-US"/>
           </a:p>
@@ -665,7 +665,7 @@
           <a:p>
             <a:fld id="{66B101DA-477C-8F46-972E-1B35D2B6D4D5}" type="datetimeFigureOut">
               <a:rPr kumimoji="1" lang="zh-CN" altLang="en-US" smtClean="0"/>
-              <a:t>2025/3/21</a:t>
+              <a:t>2025/6/13</a:t>
             </a:fld>
             <a:endParaRPr kumimoji="1" lang="zh-CN" altLang="en-US"/>
           </a:p>
@@ -863,7 +863,7 @@
           <a:p>
             <a:fld id="{66B101DA-477C-8F46-972E-1B35D2B6D4D5}" type="datetimeFigureOut">
               <a:rPr kumimoji="1" lang="zh-CN" altLang="en-US" smtClean="0"/>
-              <a:t>2025/3/21</a:t>
+              <a:t>2025/6/13</a:t>
             </a:fld>
             <a:endParaRPr kumimoji="1" lang="zh-CN" altLang="en-US"/>
           </a:p>
@@ -1138,7 +1138,7 @@
           <a:p>
             <a:fld id="{66B101DA-477C-8F46-972E-1B35D2B6D4D5}" type="datetimeFigureOut">
               <a:rPr kumimoji="1" lang="zh-CN" altLang="en-US" smtClean="0"/>
-              <a:t>2025/3/21</a:t>
+              <a:t>2025/6/13</a:t>
             </a:fld>
             <a:endParaRPr kumimoji="1" lang="zh-CN" altLang="en-US"/>
           </a:p>
@@ -1403,7 +1403,7 @@
           <a:p>
             <a:fld id="{66B101DA-477C-8F46-972E-1B35D2B6D4D5}" type="datetimeFigureOut">
               <a:rPr kumimoji="1" lang="zh-CN" altLang="en-US" smtClean="0"/>
-              <a:t>2025/3/21</a:t>
+              <a:t>2025/6/13</a:t>
             </a:fld>
             <a:endParaRPr kumimoji="1" lang="zh-CN" altLang="en-US"/>
           </a:p>
@@ -1815,7 +1815,7 @@
           <a:p>
             <a:fld id="{66B101DA-477C-8F46-972E-1B35D2B6D4D5}" type="datetimeFigureOut">
               <a:rPr kumimoji="1" lang="zh-CN" altLang="en-US" smtClean="0"/>
-              <a:t>2025/3/21</a:t>
+              <a:t>2025/6/13</a:t>
             </a:fld>
             <a:endParaRPr kumimoji="1" lang="zh-CN" altLang="en-US"/>
           </a:p>
@@ -1956,7 +1956,7 @@
           <a:p>
             <a:fld id="{66B101DA-477C-8F46-972E-1B35D2B6D4D5}" type="datetimeFigureOut">
               <a:rPr kumimoji="1" lang="zh-CN" altLang="en-US" smtClean="0"/>
-              <a:t>2025/3/21</a:t>
+              <a:t>2025/6/13</a:t>
             </a:fld>
             <a:endParaRPr kumimoji="1" lang="zh-CN" altLang="en-US"/>
           </a:p>
@@ -2069,7 +2069,7 @@
           <a:p>
             <a:fld id="{66B101DA-477C-8F46-972E-1B35D2B6D4D5}" type="datetimeFigureOut">
               <a:rPr kumimoji="1" lang="zh-CN" altLang="en-US" smtClean="0"/>
-              <a:t>2025/3/21</a:t>
+              <a:t>2025/6/13</a:t>
             </a:fld>
             <a:endParaRPr kumimoji="1" lang="zh-CN" altLang="en-US"/>
           </a:p>
@@ -2380,7 +2380,7 @@
           <a:p>
             <a:fld id="{66B101DA-477C-8F46-972E-1B35D2B6D4D5}" type="datetimeFigureOut">
               <a:rPr kumimoji="1" lang="zh-CN" altLang="en-US" smtClean="0"/>
-              <a:t>2025/3/21</a:t>
+              <a:t>2025/6/13</a:t>
             </a:fld>
             <a:endParaRPr kumimoji="1" lang="zh-CN" altLang="en-US"/>
           </a:p>
@@ -2668,7 +2668,7 @@
           <a:p>
             <a:fld id="{66B101DA-477C-8F46-972E-1B35D2B6D4D5}" type="datetimeFigureOut">
               <a:rPr kumimoji="1" lang="zh-CN" altLang="en-US" smtClean="0"/>
-              <a:t>2025/3/21</a:t>
+              <a:t>2025/6/13</a:t>
             </a:fld>
             <a:endParaRPr kumimoji="1" lang="zh-CN" altLang="en-US"/>
           </a:p>
@@ -2909,7 +2909,7 @@
           <a:p>
             <a:fld id="{66B101DA-477C-8F46-972E-1B35D2B6D4D5}" type="datetimeFigureOut">
               <a:rPr kumimoji="1" lang="zh-CN" altLang="en-US" smtClean="0"/>
-              <a:t>2025/3/21</a:t>
+              <a:t>2025/6/13</a:t>
             </a:fld>
             <a:endParaRPr kumimoji="1" lang="zh-CN" altLang="en-US"/>
           </a:p>
@@ -3839,6 +3839,121 @@
           </a:graphicData>
         </a:graphic>
       </p:graphicFrame>
+      <p:sp>
+        <p:nvSpPr>
+          <p:cNvPr id="6" name="椭圆 5">
+            <a:extLst>
+              <a:ext uri="{FF2B5EF4-FFF2-40B4-BE49-F238E27FC236}">
+                <a16:creationId xmlns:a16="http://schemas.microsoft.com/office/drawing/2014/main" id="{201D974E-CA85-1118-EB36-E08B44C12EA6}"/>
+              </a:ext>
+            </a:extLst>
+          </p:cNvPr>
+          <p:cNvSpPr/>
+          <p:nvPr/>
+        </p:nvSpPr>
+        <p:spPr>
+          <a:xfrm>
+            <a:off x="1370475" y="2573905"/>
+            <a:ext cx="1244946" cy="3456338"/>
+          </a:xfrm>
+          <a:custGeom>
+            <a:avLst/>
+            <a:gdLst>
+              <a:gd name="connsiteX0" fmla="*/ 0 w 2115235"/>
+              <a:gd name="connsiteY0" fmla="*/ 1728169 h 3456338"/>
+              <a:gd name="connsiteX1" fmla="*/ 1057618 w 2115235"/>
+              <a:gd name="connsiteY1" fmla="*/ 0 h 3456338"/>
+              <a:gd name="connsiteX2" fmla="*/ 2115236 w 2115235"/>
+              <a:gd name="connsiteY2" fmla="*/ 1728169 h 3456338"/>
+              <a:gd name="connsiteX3" fmla="*/ 1057618 w 2115235"/>
+              <a:gd name="connsiteY3" fmla="*/ 3456338 h 3456338"/>
+              <a:gd name="connsiteX4" fmla="*/ 0 w 2115235"/>
+              <a:gd name="connsiteY4" fmla="*/ 1728169 h 3456338"/>
+              <a:gd name="connsiteX0" fmla="*/ 0 w 1244946"/>
+              <a:gd name="connsiteY0" fmla="*/ 1728169 h 3456338"/>
+              <a:gd name="connsiteX1" fmla="*/ 1057618 w 1244946"/>
+              <a:gd name="connsiteY1" fmla="*/ 0 h 3456338"/>
+              <a:gd name="connsiteX2" fmla="*/ 1244378 w 1244946"/>
+              <a:gd name="connsiteY2" fmla="*/ 1728169 h 3456338"/>
+              <a:gd name="connsiteX3" fmla="*/ 1057618 w 1244946"/>
+              <a:gd name="connsiteY3" fmla="*/ 3456338 h 3456338"/>
+              <a:gd name="connsiteX4" fmla="*/ 0 w 1244946"/>
+              <a:gd name="connsiteY4" fmla="*/ 1728169 h 3456338"/>
+            </a:gdLst>
+            <a:ahLst/>
+            <a:cxnLst>
+              <a:cxn ang="0">
+                <a:pos x="connsiteX0" y="connsiteY0"/>
+              </a:cxn>
+              <a:cxn ang="0">
+                <a:pos x="connsiteX1" y="connsiteY1"/>
+              </a:cxn>
+              <a:cxn ang="0">
+                <a:pos x="connsiteX2" y="connsiteY2"/>
+              </a:cxn>
+              <a:cxn ang="0">
+                <a:pos x="connsiteX3" y="connsiteY3"/>
+              </a:cxn>
+              <a:cxn ang="0">
+                <a:pos x="connsiteX4" y="connsiteY4"/>
+              </a:cxn>
+            </a:cxnLst>
+            <a:rect l="l" t="t" r="r" b="b"/>
+            <a:pathLst>
+              <a:path w="1244946" h="3456338">
+                <a:moveTo>
+                  <a:pt x="0" y="1728169"/>
+                </a:moveTo>
+                <a:cubicBezTo>
+                  <a:pt x="0" y="773728"/>
+                  <a:pt x="850222" y="0"/>
+                  <a:pt x="1057618" y="0"/>
+                </a:cubicBezTo>
+                <a:cubicBezTo>
+                  <a:pt x="1265014" y="0"/>
+                  <a:pt x="1244378" y="773728"/>
+                  <a:pt x="1244378" y="1728169"/>
+                </a:cubicBezTo>
+                <a:cubicBezTo>
+                  <a:pt x="1244378" y="2682610"/>
+                  <a:pt x="1265014" y="3456338"/>
+                  <a:pt x="1057618" y="3456338"/>
+                </a:cubicBezTo>
+                <a:cubicBezTo>
+                  <a:pt x="850222" y="3456338"/>
+                  <a:pt x="0" y="2682610"/>
+                  <a:pt x="0" y="1728169"/>
+                </a:cubicBezTo>
+                <a:close/>
+              </a:path>
+            </a:pathLst>
+          </a:custGeom>
+        </p:spPr>
+        <p:style>
+          <a:lnRef idx="2">
+            <a:schemeClr val="accent1">
+              <a:shade val="15000"/>
+            </a:schemeClr>
+          </a:lnRef>
+          <a:fillRef idx="1">
+            <a:schemeClr val="accent1"/>
+          </a:fillRef>
+          <a:effectRef idx="0">
+            <a:schemeClr val="accent1"/>
+          </a:effectRef>
+          <a:fontRef idx="minor">
+            <a:schemeClr val="lt1"/>
+          </a:fontRef>
+        </p:style>
+        <p:txBody>
+          <a:bodyPr rtlCol="0" anchor="ctr"/>
+          <a:lstStyle/>
+          <a:p>
+            <a:pPr algn="ctr"/>
+            <a:endParaRPr kumimoji="1" lang="zh-CN" altLang="en-US"/>
+          </a:p>
+        </p:txBody>
+      </p:sp>
     </p:spTree>
     <p:extLst>
       <p:ext uri="{BB962C8B-B14F-4D97-AF65-F5344CB8AC3E}">

</xml_diff>